<commit_message>
Element -> Object 저장
</commit_message>
<xml_diff>
--- a/Visual Light Novel.pptx
+++ b/Visual Light Novel.pptx
@@ -11,7 +11,8 @@
     <p:sldId id="259" r:id="rId5"/>
     <p:sldId id="260" r:id="rId6"/>
     <p:sldId id="262" r:id="rId7"/>
-    <p:sldId id="261" r:id="rId8"/>
+    <p:sldId id="263" r:id="rId8"/>
+    <p:sldId id="261" r:id="rId9"/>
   </p:sldIdLst>
   <p:sldSz cx="12192000" cy="6858000"/>
   <p:notesSz cx="6858000" cy="9144000"/>
@@ -213,7 +214,7 @@
           <a:effectLst/>
           <a:extLst>
             <a:ext uri="{91240B29-F687-4f45-9708-019B960494DF}">
-              <a14:hiddenLine xmlns="" xmlns:a14="http://schemas.microsoft.com/office/drawing/2010/main" w="9525">
+              <a14:hiddenLine xmlns:a14="http://schemas.microsoft.com/office/drawing/2010/main" xmlns="" w="9525">
                 <a:solidFill>
                   <a:srgbClr val="000000"/>
                 </a:solidFill>
@@ -406,7 +407,7 @@
             <a:fld id="{08B9EBBA-996F-894A-B54A-D6246ED52CEA}" type="datetimeFigureOut">
               <a:rPr lang="en-US" smtClean="0"/>
               <a:pPr/>
-              <a:t>11/3/2018</a:t>
+              <a:t>11/6/2018</a:t>
             </a:fld>
             <a:endParaRPr lang="en-US" dirty="0"/>
           </a:p>
@@ -726,7 +727,7 @@
             <a:fld id="{18C79C5D-2A6F-F04D-97DA-BEF2467B64E4}" type="datetimeFigureOut">
               <a:rPr lang="en-US" smtClean="0"/>
               <a:pPr/>
-              <a:t>11/3/2018</a:t>
+              <a:t>11/6/2018</a:t>
             </a:fld>
             <a:endParaRPr lang="en-US" dirty="0"/>
           </a:p>
@@ -1216,7 +1217,7 @@
             <a:fld id="{8DFA1846-DA80-1C48-A609-854EA85C59AD}" type="datetimeFigureOut">
               <a:rPr lang="en-US" smtClean="0"/>
               <a:pPr/>
-              <a:t>11/3/2018</a:t>
+              <a:t>11/6/2018</a:t>
             </a:fld>
             <a:endParaRPr lang="en-US" dirty="0"/>
           </a:p>
@@ -1587,7 +1588,7 @@
             <a:fld id="{FBF54567-0DE4-3F47-BF90-CB84690072F9}" type="datetimeFigureOut">
               <a:rPr lang="en-US" smtClean="0"/>
               <a:pPr/>
-              <a:t>11/3/2018</a:t>
+              <a:t>11/6/2018</a:t>
             </a:fld>
             <a:endParaRPr lang="en-US" dirty="0"/>
           </a:p>
@@ -1743,7 +1744,7 @@
           <a:ln/>
           <a:extLst>
             <a:ext uri="{91240B29-F687-4f45-9708-019B960494DF}">
-              <a14:hiddenLine xmlns="" xmlns:a14="http://schemas.microsoft.com/office/drawing/2010/main" w="9525">
+              <a14:hiddenLine xmlns:a14="http://schemas.microsoft.com/office/drawing/2010/main" xmlns="" w="9525">
                 <a:solidFill>
                   <a:srgbClr val="000000"/>
                 </a:solidFill>
@@ -1862,7 +1863,7 @@
             <a:fld id="{C6C52C72-DE31-F449-A4ED-4C594FD91407}" type="datetimeFigureOut">
               <a:rPr lang="en-US" smtClean="0"/>
               <a:pPr/>
-              <a:t>11/3/2018</a:t>
+              <a:t>11/6/2018</a:t>
             </a:fld>
             <a:endParaRPr lang="en-US" dirty="0"/>
           </a:p>
@@ -2020,7 +2021,7 @@
           <a:ln/>
           <a:extLst>
             <a:ext uri="{91240B29-F687-4f45-9708-019B960494DF}">
-              <a14:hiddenLine xmlns="" xmlns:a14="http://schemas.microsoft.com/office/drawing/2010/main" w="9525">
+              <a14:hiddenLine xmlns:a14="http://schemas.microsoft.com/office/drawing/2010/main" xmlns="" w="9525">
                 <a:solidFill>
                   <a:srgbClr val="000000"/>
                 </a:solidFill>
@@ -2149,7 +2150,7 @@
             <a:fld id="{ED62726E-379B-B349-9EED-81ED093FA806}" type="datetimeFigureOut">
               <a:rPr lang="en-US" smtClean="0"/>
               <a:pPr/>
-              <a:t>11/3/2018</a:t>
+              <a:t>11/6/2018</a:t>
             </a:fld>
             <a:endParaRPr lang="en-US" dirty="0"/>
           </a:p>
@@ -2305,7 +2306,7 @@
           <a:ln/>
           <a:extLst>
             <a:ext uri="{91240B29-F687-4f45-9708-019B960494DF}">
-              <a14:hiddenLine xmlns="" xmlns:a14="http://schemas.microsoft.com/office/drawing/2010/main" w="9525">
+              <a14:hiddenLine xmlns:a14="http://schemas.microsoft.com/office/drawing/2010/main" xmlns="" w="9525">
                 <a:solidFill>
                   <a:srgbClr val="000000"/>
                 </a:solidFill>
@@ -2434,7 +2435,7 @@
             <a:fld id="{9B3A1323-8D79-1946-B0D7-40001CF92E9D}" type="datetimeFigureOut">
               <a:rPr lang="en-US" smtClean="0"/>
               <a:pPr/>
-              <a:t>11/3/2018</a:t>
+              <a:t>11/6/2018</a:t>
             </a:fld>
             <a:endParaRPr lang="en-US" dirty="0"/>
           </a:p>
@@ -2779,7 +2780,7 @@
             <a:fld id="{8DFA1846-DA80-1C48-A609-854EA85C59AD}" type="datetimeFigureOut">
               <a:rPr lang="en-US" smtClean="0"/>
               <a:pPr/>
-              <a:t>11/3/2018</a:t>
+              <a:t>11/6/2018</a:t>
             </a:fld>
             <a:endParaRPr lang="en-US" dirty="0"/>
           </a:p>
@@ -2935,7 +2936,7 @@
           <a:ln/>
           <a:extLst>
             <a:ext uri="{91240B29-F687-4f45-9708-019B960494DF}">
-              <a14:hiddenLine xmlns="" xmlns:a14="http://schemas.microsoft.com/office/drawing/2010/main" w="9525">
+              <a14:hiddenLine xmlns:a14="http://schemas.microsoft.com/office/drawing/2010/main" xmlns="" w="9525">
                 <a:solidFill>
                   <a:srgbClr val="000000"/>
                 </a:solidFill>
@@ -3120,7 +3121,7 @@
             <a:fld id="{57302355-E14B-8545-A8F8-0FE83CC9D524}" type="datetimeFigureOut">
               <a:rPr lang="en-US" smtClean="0"/>
               <a:pPr/>
-              <a:t>11/3/2018</a:t>
+              <a:t>11/6/2018</a:t>
             </a:fld>
             <a:endParaRPr lang="en-US" dirty="0"/>
           </a:p>
@@ -3276,7 +3277,7 @@
           <a:ln/>
           <a:extLst>
             <a:ext uri="{91240B29-F687-4f45-9708-019B960494DF}">
-              <a14:hiddenLine xmlns="" xmlns:a14="http://schemas.microsoft.com/office/drawing/2010/main" w="9525">
+              <a14:hiddenLine xmlns:a14="http://schemas.microsoft.com/office/drawing/2010/main" xmlns="" w="9525">
                 <a:solidFill>
                   <a:srgbClr val="000000"/>
                 </a:solidFill>
@@ -3599,7 +3600,7 @@
             <a:fld id="{02640F58-564D-2B4F-AE67-E407BA4FCF45}" type="datetimeFigureOut">
               <a:rPr lang="en-US" smtClean="0"/>
               <a:pPr/>
-              <a:t>11/3/2018</a:t>
+              <a:t>11/6/2018</a:t>
             </a:fld>
             <a:endParaRPr lang="en-US" dirty="0"/>
           </a:p>
@@ -3755,7 +3756,7 @@
           <a:ln/>
           <a:extLst>
             <a:ext uri="{91240B29-F687-4f45-9708-019B960494DF}">
-              <a14:hiddenLine xmlns="" xmlns:a14="http://schemas.microsoft.com/office/drawing/2010/main" w="9525">
+              <a14:hiddenLine xmlns:a14="http://schemas.microsoft.com/office/drawing/2010/main" xmlns="" w="9525">
                 <a:solidFill>
                   <a:srgbClr val="000000"/>
                 </a:solidFill>
@@ -3822,7 +3823,7 @@
             <a:fld id="{F13A34C8-038E-2045-AF43-DF7DBB8E0E9E}" type="datetimeFigureOut">
               <a:rPr lang="en-US" smtClean="0"/>
               <a:pPr/>
-              <a:t>11/3/2018</a:t>
+              <a:t>11/6/2018</a:t>
             </a:fld>
             <a:endParaRPr lang="en-US" dirty="0"/>
           </a:p>
@@ -3919,7 +3920,7 @@
             <a:fld id="{8818C68F-D26B-8F47-958C-23B49CF8A634}" type="datetimeFigureOut">
               <a:rPr lang="en-US" smtClean="0"/>
               <a:pPr/>
-              <a:t>11/3/2018</a:t>
+              <a:t>11/6/2018</a:t>
             </a:fld>
             <a:endParaRPr lang="en-US" dirty="0"/>
           </a:p>
@@ -4188,7 +4189,7 @@
           <a:ln/>
           <a:extLst>
             <a:ext uri="{91240B29-F687-4f45-9708-019B960494DF}">
-              <a14:hiddenLine xmlns="" xmlns:a14="http://schemas.microsoft.com/office/drawing/2010/main" w="9525">
+              <a14:hiddenLine xmlns:a14="http://schemas.microsoft.com/office/drawing/2010/main" xmlns="" w="9525">
                 <a:solidFill>
                   <a:srgbClr val="000000"/>
                 </a:solidFill>
@@ -4388,7 +4389,7 @@
             <a:fld id="{D0DF5E60-9974-AC48-9591-99C2BB44B7CF}" type="datetimeFigureOut">
               <a:rPr lang="en-US" smtClean="0"/>
               <a:pPr/>
-              <a:t>11/3/2018</a:t>
+              <a:t>11/6/2018</a:t>
             </a:fld>
             <a:endParaRPr lang="en-US" dirty="0"/>
           </a:p>
@@ -4703,7 +4704,7 @@
             <a:fld id="{18C79C5D-2A6F-F04D-97DA-BEF2467B64E4}" type="datetimeFigureOut">
               <a:rPr lang="en-US" smtClean="0"/>
               <a:pPr/>
-              <a:t>11/3/2018</a:t>
+              <a:t>11/6/2018</a:t>
             </a:fld>
             <a:endParaRPr lang="en-US" dirty="0"/>
           </a:p>
@@ -4975,7 +4976,7 @@
             <a:fld id="{09B482E8-6E0E-1B4F-B1FD-C69DB9E858D9}" type="datetimeFigureOut">
               <a:rPr lang="en-US" smtClean="0"/>
               <a:pPr/>
-              <a:t>11/3/2018</a:t>
+              <a:t>11/6/2018</a:t>
             </a:fld>
             <a:endParaRPr lang="en-US" dirty="0"/>
           </a:p>
@@ -5799,11 +5800,7 @@
             </a:r>
             <a:r>
               <a:rPr lang="ko-KR" altLang="en-US" dirty="0" smtClean="0"/>
-              <a:t>다중 창 </a:t>
-            </a:r>
-            <a:r>
-              <a:rPr lang="ko-KR" altLang="en-US" dirty="0" smtClean="0"/>
-              <a:t>제어와 </a:t>
+              <a:t>다중 창 제어와 </a:t>
             </a:r>
             <a:r>
               <a:rPr lang="en-US" altLang="ko-KR" dirty="0" smtClean="0"/>
@@ -5843,15 +5840,7 @@
             </a:r>
             <a:r>
               <a:rPr lang="ko-KR" altLang="en-US" dirty="0" smtClean="0"/>
-              <a:t>와 엔진에서</a:t>
-            </a:r>
-            <a:r>
-              <a:rPr lang="ko-KR" altLang="en-US" dirty="0" smtClean="0"/>
-              <a:t> </a:t>
-            </a:r>
-            <a:r>
-              <a:rPr lang="ko-KR" altLang="en-US" dirty="0" smtClean="0"/>
-              <a:t>제작된 </a:t>
+              <a:t>와 엔진에서 제작된 </a:t>
             </a:r>
             <a:r>
               <a:rPr lang="en-US" altLang="ko-KR" dirty="0"/>
@@ -5863,11 +5852,7 @@
             </a:r>
             <a:r>
               <a:rPr lang="ko-KR" altLang="en-US" dirty="0" smtClean="0"/>
-              <a:t>데이터를 기반으로 게임에서 </a:t>
-            </a:r>
-            <a:r>
-              <a:rPr lang="ko-KR" altLang="en-US" dirty="0" smtClean="0"/>
-              <a:t>사용</a:t>
+              <a:t>데이터를 기반으로 게임에서 사용</a:t>
             </a:r>
             <a:r>
               <a:rPr lang="en-US" altLang="ko-KR" dirty="0" smtClean="0"/>
@@ -6026,8 +6011,8 @@
         </p:nvSpPr>
         <p:spPr>
           <a:xfrm>
-            <a:off x="810000" y="4010025"/>
-            <a:ext cx="2276100" cy="533400"/>
+            <a:off x="809999" y="4010025"/>
+            <a:ext cx="3673964" cy="533400"/>
           </a:xfrm>
           <a:prstGeom prst="rect">
             <a:avLst/>
@@ -6445,7 +6430,7 @@
         </p:nvSpPr>
         <p:spPr>
           <a:xfrm>
-            <a:off x="4483963" y="4641235"/>
+            <a:off x="4552949" y="4641235"/>
             <a:ext cx="1543050" cy="646331"/>
           </a:xfrm>
           <a:prstGeom prst="rect">
@@ -6571,119 +6556,479 @@
           </a:p>
         </p:txBody>
       </p:sp>
+      <p:sp>
+        <p:nvSpPr>
+          <p:cNvPr id="26" name="TextBox 25"/>
+          <p:cNvSpPr txBox="1"/>
+          <p:nvPr/>
+        </p:nvSpPr>
+        <p:spPr>
+          <a:xfrm>
+            <a:off x="983769" y="2061665"/>
+            <a:ext cx="286766" cy="369332"/>
+          </a:xfrm>
+          <a:prstGeom prst="rect">
+            <a:avLst/>
+          </a:prstGeom>
+          <a:noFill/>
+        </p:spPr>
+        <p:txBody>
+          <a:bodyPr wrap="square" rtlCol="0">
+            <a:spAutoFit/>
+          </a:bodyPr>
+          <a:lstStyle/>
+          <a:p>
+            <a:r>
+              <a:rPr lang="ko-KR" altLang="en-US" dirty="0"/>
+              <a:t>툴</a:t>
+            </a:r>
+          </a:p>
+        </p:txBody>
+      </p:sp>
+      <p:sp>
+        <p:nvSpPr>
+          <p:cNvPr id="27" name="TextBox 26"/>
+          <p:cNvSpPr txBox="1"/>
+          <p:nvPr/>
+        </p:nvSpPr>
+        <p:spPr>
+          <a:xfrm>
+            <a:off x="288199" y="2495758"/>
+            <a:ext cx="407841" cy="646331"/>
+          </a:xfrm>
+          <a:prstGeom prst="rect">
+            <a:avLst/>
+          </a:prstGeom>
+          <a:noFill/>
+        </p:spPr>
+        <p:txBody>
+          <a:bodyPr wrap="square" rtlCol="0">
+            <a:spAutoFit/>
+          </a:bodyPr>
+          <a:lstStyle/>
+          <a:p>
+            <a:r>
+              <a:rPr lang="ko-KR" altLang="en-US" smtClean="0"/>
+              <a:t>메뉴</a:t>
+            </a:r>
+            <a:endParaRPr lang="ko-KR" altLang="en-US" dirty="0"/>
+          </a:p>
+        </p:txBody>
+      </p:sp>
+      <p:sp>
+        <p:nvSpPr>
+          <p:cNvPr id="28" name="TextBox 27"/>
+          <p:cNvSpPr txBox="1"/>
+          <p:nvPr/>
+        </p:nvSpPr>
+        <p:spPr>
+          <a:xfrm>
+            <a:off x="103757" y="3410880"/>
+            <a:ext cx="286766" cy="646331"/>
+          </a:xfrm>
+          <a:prstGeom prst="rect">
+            <a:avLst/>
+          </a:prstGeom>
+          <a:noFill/>
+        </p:spPr>
+        <p:txBody>
+          <a:bodyPr wrap="square" rtlCol="0">
+            <a:spAutoFit/>
+          </a:bodyPr>
+          <a:lstStyle/>
+          <a:p>
+            <a:r>
+              <a:rPr lang="ko-KR" altLang="en-US" dirty="0" smtClean="0"/>
+              <a:t>정보</a:t>
+            </a:r>
+            <a:endParaRPr lang="ko-KR" altLang="en-US" dirty="0"/>
+          </a:p>
+        </p:txBody>
+      </p:sp>
+      <p:sp>
+        <p:nvSpPr>
+          <p:cNvPr id="29" name="TextBox 28"/>
+          <p:cNvSpPr txBox="1"/>
+          <p:nvPr/>
+        </p:nvSpPr>
+        <p:spPr>
+          <a:xfrm>
+            <a:off x="697003" y="4513951"/>
+            <a:ext cx="286766" cy="1477328"/>
+          </a:xfrm>
+          <a:prstGeom prst="rect">
+            <a:avLst/>
+          </a:prstGeom>
+          <a:noFill/>
+        </p:spPr>
+        <p:txBody>
+          <a:bodyPr wrap="square" rtlCol="0">
+            <a:spAutoFit/>
+          </a:bodyPr>
+          <a:lstStyle/>
+          <a:p>
+            <a:r>
+              <a:rPr lang="ko-KR" altLang="en-US" dirty="0" err="1" smtClean="0"/>
+              <a:t>블루프린트</a:t>
+            </a:r>
+            <a:endParaRPr lang="ko-KR" altLang="en-US" dirty="0"/>
+          </a:p>
+        </p:txBody>
+      </p:sp>
+      <p:sp>
+        <p:nvSpPr>
+          <p:cNvPr id="30" name="TextBox 29"/>
+          <p:cNvSpPr txBox="1"/>
+          <p:nvPr/>
+        </p:nvSpPr>
+        <p:spPr>
+          <a:xfrm>
+            <a:off x="1617011" y="2372277"/>
+            <a:ext cx="856681" cy="369332"/>
+          </a:xfrm>
+          <a:prstGeom prst="rect">
+            <a:avLst/>
+          </a:prstGeom>
+          <a:noFill/>
+        </p:spPr>
+        <p:txBody>
+          <a:bodyPr wrap="square" rtlCol="0">
+            <a:spAutoFit/>
+          </a:bodyPr>
+          <a:lstStyle/>
+          <a:p>
+            <a:r>
+              <a:rPr lang="ko-KR" altLang="en-US" smtClean="0"/>
+              <a:t>게임</a:t>
+            </a:r>
+            <a:endParaRPr lang="ko-KR" altLang="en-US" dirty="0"/>
+          </a:p>
+        </p:txBody>
+      </p:sp>
+      <p:sp>
+        <p:nvSpPr>
+          <p:cNvPr id="31" name="TextBox 30"/>
+          <p:cNvSpPr txBox="1"/>
+          <p:nvPr/>
+        </p:nvSpPr>
+        <p:spPr>
+          <a:xfrm>
+            <a:off x="4107220" y="2372277"/>
+            <a:ext cx="669216" cy="369332"/>
+          </a:xfrm>
+          <a:prstGeom prst="rect">
+            <a:avLst/>
+          </a:prstGeom>
+          <a:noFill/>
+        </p:spPr>
+        <p:txBody>
+          <a:bodyPr wrap="square" rtlCol="0">
+            <a:spAutoFit/>
+          </a:bodyPr>
+          <a:lstStyle/>
+          <a:p>
+            <a:r>
+              <a:rPr lang="ko-KR" altLang="en-US" dirty="0" smtClean="0"/>
+              <a:t>계층</a:t>
+            </a:r>
+            <a:endParaRPr lang="ko-KR" altLang="en-US" dirty="0"/>
+          </a:p>
+        </p:txBody>
+      </p:sp>
+      <p:sp>
+        <p:nvSpPr>
+          <p:cNvPr id="32" name="TextBox 31"/>
+          <p:cNvSpPr txBox="1"/>
+          <p:nvPr/>
+        </p:nvSpPr>
+        <p:spPr>
+          <a:xfrm>
+            <a:off x="5285998" y="2450599"/>
+            <a:ext cx="5833836" cy="646331"/>
+          </a:xfrm>
+          <a:prstGeom prst="rect">
+            <a:avLst/>
+          </a:prstGeom>
+          <a:noFill/>
+        </p:spPr>
+        <p:txBody>
+          <a:bodyPr wrap="square" rtlCol="0">
+            <a:spAutoFit/>
+          </a:bodyPr>
+          <a:lstStyle/>
+          <a:p>
+            <a:r>
+              <a:rPr lang="ko-KR" altLang="en-US" dirty="0" smtClean="0"/>
+              <a:t>데이터를 시각화하여 원하는 함수를 정의 및 호출 하며</a:t>
+            </a:r>
+            <a:endParaRPr lang="en-US" altLang="ko-KR" dirty="0" smtClean="0"/>
+          </a:p>
+          <a:p>
+            <a:r>
+              <a:rPr lang="ko-KR" altLang="en-US" dirty="0" smtClean="0"/>
+              <a:t>편집 가능한 </a:t>
+            </a:r>
+            <a:r>
+              <a:rPr lang="ko-KR" altLang="en-US" dirty="0" err="1" smtClean="0"/>
+              <a:t>모든곳에서</a:t>
+            </a:r>
+            <a:r>
+              <a:rPr lang="en-US" altLang="ko-KR" dirty="0" smtClean="0"/>
+              <a:t> </a:t>
+            </a:r>
+            <a:r>
+              <a:rPr lang="ko-KR" altLang="en-US" dirty="0" smtClean="0"/>
+              <a:t>사용된다</a:t>
+            </a:r>
+            <a:r>
+              <a:rPr lang="en-US" altLang="ko-KR" dirty="0"/>
+              <a:t>.</a:t>
+            </a:r>
+            <a:endParaRPr lang="en-US" altLang="ko-KR" dirty="0" smtClean="0"/>
+          </a:p>
+        </p:txBody>
+      </p:sp>
+      <p:sp>
+        <p:nvSpPr>
+          <p:cNvPr id="33" name="직사각형 32"/>
+          <p:cNvSpPr/>
+          <p:nvPr/>
+        </p:nvSpPr>
+        <p:spPr>
+          <a:xfrm>
+            <a:off x="5285998" y="3608485"/>
+            <a:ext cx="6096000" cy="1923604"/>
+          </a:xfrm>
+          <a:prstGeom prst="rect">
+            <a:avLst/>
+          </a:prstGeom>
+        </p:spPr>
+        <p:txBody>
+          <a:bodyPr>
+            <a:spAutoFit/>
+          </a:bodyPr>
+          <a:lstStyle/>
+          <a:p>
+            <a:r>
+              <a:rPr lang="ko-KR" altLang="en-US" sz="2000" b="1" dirty="0" err="1"/>
+              <a:t>블루프린트</a:t>
+            </a:r>
+            <a:r>
+              <a:rPr lang="ko-KR" altLang="en-US" sz="2000" b="1" dirty="0"/>
+              <a:t> </a:t>
+            </a:r>
+            <a:r>
+              <a:rPr lang="en-US" altLang="ko-KR" sz="2000" b="1" dirty="0"/>
+              <a:t>(</a:t>
+            </a:r>
+            <a:r>
+              <a:rPr lang="ko-KR" altLang="en-US" sz="2000" b="1" dirty="0" err="1"/>
+              <a:t>언리얼</a:t>
+            </a:r>
+            <a:r>
+              <a:rPr lang="ko-KR" altLang="en-US" sz="2000" b="1" dirty="0"/>
+              <a:t> 엔진 </a:t>
+            </a:r>
+            <a:r>
+              <a:rPr lang="en-US" altLang="ko-KR" sz="2000" b="1" dirty="0"/>
+              <a:t>4 </a:t>
+            </a:r>
+            <a:r>
+              <a:rPr lang="ko-KR" altLang="en-US" sz="2000" b="1" dirty="0"/>
+              <a:t>에서 착안</a:t>
+            </a:r>
+            <a:r>
+              <a:rPr lang="en-US" altLang="ko-KR" sz="2000" b="1" dirty="0" smtClean="0"/>
+              <a:t>)</a:t>
+            </a:r>
+            <a:endParaRPr lang="en-US" altLang="ko-KR" sz="2000" b="1" dirty="0"/>
+          </a:p>
+          <a:p>
+            <a:pPr>
+              <a:lnSpc>
+                <a:spcPct val="150000"/>
+              </a:lnSpc>
+            </a:pPr>
+            <a:r>
+              <a:rPr lang="ko-KR" altLang="en-US" dirty="0"/>
+              <a:t>유형에 따라 실행 내용을 다르게 하고</a:t>
+            </a:r>
+            <a:endParaRPr lang="en-US" altLang="ko-KR" dirty="0"/>
+          </a:p>
+          <a:p>
+            <a:r>
+              <a:rPr lang="ko-KR" altLang="en-US" dirty="0"/>
+              <a:t>그 실행에 필요한 데이터를 연결하여 적용하는 </a:t>
+            </a:r>
+            <a:r>
+              <a:rPr lang="ko-KR" altLang="en-US" dirty="0" smtClean="0"/>
+              <a:t>시스템</a:t>
+            </a:r>
+            <a:endParaRPr lang="en-US" altLang="ko-KR" dirty="0" smtClean="0"/>
+          </a:p>
+          <a:p>
+            <a:endParaRPr lang="en-US" altLang="ko-KR" dirty="0"/>
+          </a:p>
+          <a:p>
+            <a:r>
+              <a:rPr lang="ko-KR" altLang="en-US" dirty="0" smtClean="0"/>
+              <a:t>노드 데이터는 </a:t>
+            </a:r>
+            <a:r>
+              <a:rPr lang="en-US" altLang="ko-KR" dirty="0" smtClean="0"/>
+              <a:t>STL vector </a:t>
+            </a:r>
+            <a:r>
+              <a:rPr lang="ko-KR" altLang="en-US" dirty="0" smtClean="0"/>
+              <a:t>에 담아두고</a:t>
+            </a:r>
+            <a:endParaRPr lang="en-US" altLang="ko-KR" dirty="0" smtClean="0"/>
+          </a:p>
+          <a:p>
+            <a:r>
+              <a:rPr lang="ko-KR" altLang="en-US" dirty="0" smtClean="0"/>
+              <a:t>실행 노드는 더블 </a:t>
+            </a:r>
+            <a:r>
+              <a:rPr lang="ko-KR" altLang="en-US" dirty="0" err="1" smtClean="0"/>
+              <a:t>링크드</a:t>
+            </a:r>
+            <a:r>
+              <a:rPr lang="ko-KR" altLang="en-US" dirty="0" smtClean="0"/>
+              <a:t> 리스트로 연결</a:t>
+            </a:r>
+            <a:endParaRPr lang="ko-KR" altLang="en-US" dirty="0"/>
+          </a:p>
+        </p:txBody>
+      </p:sp>
       <p:grpSp>
         <p:nvGrpSpPr>
-          <p:cNvPr id="24" name="그룹 23"/>
+          <p:cNvPr id="5" name="그룹 4"/>
           <p:cNvGrpSpPr/>
           <p:nvPr/>
         </p:nvGrpSpPr>
         <p:grpSpPr>
           <a:xfrm>
-            <a:off x="444290" y="2385143"/>
-            <a:ext cx="4300965" cy="3939742"/>
-            <a:chOff x="1204686" y="1417638"/>
-            <a:chExt cx="5273116" cy="4830245"/>
+            <a:off x="444290" y="2385142"/>
+            <a:ext cx="4300965" cy="2128810"/>
+            <a:chOff x="444290" y="2385142"/>
+            <a:chExt cx="4300965" cy="2128810"/>
           </a:xfrm>
         </p:grpSpPr>
+        <p:grpSp>
+          <p:nvGrpSpPr>
+            <p:cNvPr id="24" name="그룹 23"/>
+            <p:cNvGrpSpPr/>
+            <p:nvPr/>
+          </p:nvGrpSpPr>
+          <p:grpSpPr>
+            <a:xfrm>
+              <a:off x="444290" y="2529632"/>
+              <a:ext cx="4300965" cy="1984320"/>
+              <a:chOff x="1204686" y="1594786"/>
+              <a:chExt cx="5273116" cy="2432837"/>
+            </a:xfrm>
+          </p:grpSpPr>
+          <p:pic>
+            <p:nvPicPr>
+              <p:cNvPr id="3" name="그림 2"/>
+              <p:cNvPicPr>
+                <a:picLocks noChangeAspect="1"/>
+              </p:cNvPicPr>
+              <p:nvPr/>
+            </p:nvPicPr>
+            <p:blipFill>
+              <a:blip r:embed="rId2"/>
+              <a:stretch>
+                <a:fillRect/>
+              </a:stretch>
+            </p:blipFill>
+            <p:spPr>
+              <a:xfrm>
+                <a:off x="1948710" y="1807364"/>
+                <a:ext cx="3785069" cy="2220259"/>
+              </a:xfrm>
+              <a:prstGeom prst="rect">
+                <a:avLst/>
+              </a:prstGeom>
+            </p:spPr>
+          </p:pic>
+          <p:pic>
+            <p:nvPicPr>
+              <p:cNvPr id="19" name="그림 18"/>
+              <p:cNvPicPr>
+                <a:picLocks noChangeAspect="1"/>
+              </p:cNvPicPr>
+              <p:nvPr/>
+            </p:nvPicPr>
+            <p:blipFill>
+              <a:blip r:embed="rId3"/>
+              <a:stretch>
+                <a:fillRect/>
+              </a:stretch>
+            </p:blipFill>
+            <p:spPr>
+              <a:xfrm>
+                <a:off x="1470408" y="1594786"/>
+                <a:ext cx="478301" cy="1157369"/>
+              </a:xfrm>
+              <a:prstGeom prst="rect">
+                <a:avLst/>
+              </a:prstGeom>
+            </p:spPr>
+          </p:pic>
+          <p:pic>
+            <p:nvPicPr>
+              <p:cNvPr id="20" name="그림 19"/>
+              <p:cNvPicPr>
+                <a:picLocks noChangeAspect="1"/>
+              </p:cNvPicPr>
+              <p:nvPr/>
+            </p:nvPicPr>
+            <p:blipFill>
+              <a:blip r:embed="rId4"/>
+              <a:stretch>
+                <a:fillRect/>
+              </a:stretch>
+            </p:blipFill>
+            <p:spPr>
+              <a:xfrm>
+                <a:off x="1204686" y="2752155"/>
+                <a:ext cx="744023" cy="1275468"/>
+              </a:xfrm>
+              <a:prstGeom prst="rect">
+                <a:avLst/>
+              </a:prstGeom>
+            </p:spPr>
+          </p:pic>
+          <p:pic>
+            <p:nvPicPr>
+              <p:cNvPr id="21" name="그림 20"/>
+              <p:cNvPicPr>
+                <a:picLocks noChangeAspect="1"/>
+              </p:cNvPicPr>
+              <p:nvPr/>
+            </p:nvPicPr>
+            <p:blipFill>
+              <a:blip r:embed="rId5"/>
+              <a:stretch>
+                <a:fillRect/>
+              </a:stretch>
+            </p:blipFill>
+            <p:spPr>
+              <a:xfrm>
+                <a:off x="5733779" y="1807364"/>
+                <a:ext cx="744023" cy="2220259"/>
+              </a:xfrm>
+              <a:prstGeom prst="rect">
+                <a:avLst/>
+              </a:prstGeom>
+            </p:spPr>
+          </p:pic>
+        </p:grpSp>
         <p:pic>
           <p:nvPicPr>
-            <p:cNvPr id="3" name="그림 2"/>
-            <p:cNvPicPr>
-              <a:picLocks noChangeAspect="1"/>
-            </p:cNvPicPr>
-            <p:nvPr/>
-          </p:nvPicPr>
-          <p:blipFill>
-            <a:blip r:embed="rId2"/>
-            <a:stretch>
-              <a:fillRect/>
-            </a:stretch>
-          </p:blipFill>
-          <p:spPr>
-            <a:xfrm>
-              <a:off x="1948710" y="1807364"/>
-              <a:ext cx="3785069" cy="2220259"/>
-            </a:xfrm>
-            <a:prstGeom prst="rect">
-              <a:avLst/>
-            </a:prstGeom>
-          </p:spPr>
-        </p:pic>
-        <p:pic>
-          <p:nvPicPr>
-            <p:cNvPr id="18" name="그림 17"/>
-            <p:cNvPicPr>
-              <a:picLocks noChangeAspect="1"/>
-            </p:cNvPicPr>
-            <p:nvPr/>
-          </p:nvPicPr>
-          <p:blipFill>
-            <a:blip r:embed="rId3"/>
-            <a:stretch>
-              <a:fillRect/>
-            </a:stretch>
-          </p:blipFill>
-          <p:spPr>
-            <a:xfrm>
-              <a:off x="1948710" y="1417638"/>
-              <a:ext cx="744023" cy="389726"/>
-            </a:xfrm>
-            <a:prstGeom prst="rect">
-              <a:avLst/>
-            </a:prstGeom>
-          </p:spPr>
-        </p:pic>
-        <p:pic>
-          <p:nvPicPr>
-            <p:cNvPr id="19" name="그림 18"/>
-            <p:cNvPicPr>
-              <a:picLocks noChangeAspect="1"/>
-            </p:cNvPicPr>
-            <p:nvPr/>
-          </p:nvPicPr>
-          <p:blipFill>
-            <a:blip r:embed="rId4"/>
-            <a:stretch>
-              <a:fillRect/>
-            </a:stretch>
-          </p:blipFill>
-          <p:spPr>
-            <a:xfrm>
-              <a:off x="1470408" y="1594786"/>
-              <a:ext cx="478301" cy="1157369"/>
-            </a:xfrm>
-            <a:prstGeom prst="rect">
-              <a:avLst/>
-            </a:prstGeom>
-          </p:spPr>
-        </p:pic>
-        <p:pic>
-          <p:nvPicPr>
-            <p:cNvPr id="20" name="그림 19"/>
-            <p:cNvPicPr>
-              <a:picLocks noChangeAspect="1"/>
-            </p:cNvPicPr>
-            <p:nvPr/>
-          </p:nvPicPr>
-          <p:blipFill>
-            <a:blip r:embed="rId5"/>
-            <a:stretch>
-              <a:fillRect/>
-            </a:stretch>
-          </p:blipFill>
-          <p:spPr>
-            <a:xfrm>
-              <a:off x="1204686" y="2752155"/>
-              <a:ext cx="744023" cy="1275468"/>
-            </a:xfrm>
-            <a:prstGeom prst="rect">
-              <a:avLst/>
-            </a:prstGeom>
-          </p:spPr>
-        </p:pic>
-        <p:pic>
-          <p:nvPicPr>
-            <p:cNvPr id="21" name="그림 20"/>
+            <p:cNvPr id="4" name="그림 3"/>
             <p:cNvPicPr>
               <a:picLocks noChangeAspect="1"/>
             </p:cNvPicPr>
@@ -6697,32 +7042,8 @@
           </p:blipFill>
           <p:spPr>
             <a:xfrm>
-              <a:off x="5733779" y="1807364"/>
-              <a:ext cx="744023" cy="2220259"/>
-            </a:xfrm>
-            <a:prstGeom prst="rect">
-              <a:avLst/>
-            </a:prstGeom>
-          </p:spPr>
-        </p:pic>
-        <p:pic>
-          <p:nvPicPr>
-            <p:cNvPr id="23" name="그림 22"/>
-            <p:cNvPicPr>
-              <a:picLocks noChangeAspect="1"/>
-            </p:cNvPicPr>
-            <p:nvPr/>
-          </p:nvPicPr>
-          <p:blipFill>
-            <a:blip r:embed="rId7"/>
-            <a:stretch>
-              <a:fillRect/>
-            </a:stretch>
-          </p:blipFill>
-          <p:spPr>
-            <a:xfrm>
-              <a:off x="1948708" y="4027623"/>
-              <a:ext cx="3785070" cy="2220260"/>
+              <a:off x="1051144" y="2385142"/>
+              <a:ext cx="606857" cy="317877"/>
             </a:xfrm>
             <a:prstGeom prst="rect">
               <a:avLst/>
@@ -6730,369 +7051,30 @@
           </p:spPr>
         </p:pic>
       </p:grpSp>
-      <p:sp>
-        <p:nvSpPr>
-          <p:cNvPr id="26" name="TextBox 25"/>
-          <p:cNvSpPr txBox="1"/>
+      <p:pic>
+        <p:nvPicPr>
+          <p:cNvPr id="6" name="그림 5"/>
+          <p:cNvPicPr>
+            <a:picLocks noChangeAspect="1"/>
+          </p:cNvPicPr>
           <p:nvPr/>
-        </p:nvSpPr>
+        </p:nvPicPr>
+        <p:blipFill>
+          <a:blip r:embed="rId7"/>
+          <a:stretch>
+            <a:fillRect/>
+          </a:stretch>
+        </p:blipFill>
         <p:spPr>
           <a:xfrm>
-            <a:off x="983769" y="2061665"/>
-            <a:ext cx="286766" cy="369332"/>
-          </a:xfrm>
-          <a:prstGeom prst="rect">
-            <a:avLst/>
-          </a:prstGeom>
-          <a:noFill/>
-        </p:spPr>
-        <p:txBody>
-          <a:bodyPr wrap="square" rtlCol="0">
-            <a:spAutoFit/>
-          </a:bodyPr>
-          <a:lstStyle/>
-          <a:p>
-            <a:r>
-              <a:rPr lang="ko-KR" altLang="en-US" dirty="0"/>
-              <a:t>툴</a:t>
-            </a:r>
-          </a:p>
-        </p:txBody>
-      </p:sp>
-      <p:sp>
-        <p:nvSpPr>
-          <p:cNvPr id="27" name="TextBox 26"/>
-          <p:cNvSpPr txBox="1"/>
-          <p:nvPr/>
-        </p:nvSpPr>
-        <p:spPr>
-          <a:xfrm>
-            <a:off x="288199" y="2495758"/>
-            <a:ext cx="407841" cy="646331"/>
-          </a:xfrm>
-          <a:prstGeom prst="rect">
-            <a:avLst/>
-          </a:prstGeom>
-          <a:noFill/>
-        </p:spPr>
-        <p:txBody>
-          <a:bodyPr wrap="square" rtlCol="0">
-            <a:spAutoFit/>
-          </a:bodyPr>
-          <a:lstStyle/>
-          <a:p>
-            <a:r>
-              <a:rPr lang="ko-KR" altLang="en-US" smtClean="0"/>
-              <a:t>메뉴</a:t>
-            </a:r>
-            <a:endParaRPr lang="ko-KR" altLang="en-US" dirty="0"/>
-          </a:p>
-        </p:txBody>
-      </p:sp>
-      <p:sp>
-        <p:nvSpPr>
-          <p:cNvPr id="28" name="TextBox 27"/>
-          <p:cNvSpPr txBox="1"/>
-          <p:nvPr/>
-        </p:nvSpPr>
-        <p:spPr>
-          <a:xfrm>
-            <a:off x="103757" y="3410880"/>
-            <a:ext cx="286766" cy="646331"/>
-          </a:xfrm>
-          <a:prstGeom prst="rect">
-            <a:avLst/>
-          </a:prstGeom>
-          <a:noFill/>
-        </p:spPr>
-        <p:txBody>
-          <a:bodyPr wrap="square" rtlCol="0">
-            <a:spAutoFit/>
-          </a:bodyPr>
-          <a:lstStyle/>
-          <a:p>
-            <a:r>
-              <a:rPr lang="ko-KR" altLang="en-US" dirty="0" smtClean="0"/>
-              <a:t>정보</a:t>
-            </a:r>
-            <a:endParaRPr lang="ko-KR" altLang="en-US" dirty="0"/>
-          </a:p>
-        </p:txBody>
-      </p:sp>
-      <p:sp>
-        <p:nvSpPr>
-          <p:cNvPr id="29" name="TextBox 28"/>
-          <p:cNvSpPr txBox="1"/>
-          <p:nvPr/>
-        </p:nvSpPr>
-        <p:spPr>
-          <a:xfrm>
-            <a:off x="697003" y="4513951"/>
-            <a:ext cx="286766" cy="1477328"/>
-          </a:xfrm>
-          <a:prstGeom prst="rect">
-            <a:avLst/>
-          </a:prstGeom>
-          <a:noFill/>
-        </p:spPr>
-        <p:txBody>
-          <a:bodyPr wrap="square" rtlCol="0">
-            <a:spAutoFit/>
-          </a:bodyPr>
-          <a:lstStyle/>
-          <a:p>
-            <a:r>
-              <a:rPr lang="ko-KR" altLang="en-US" dirty="0" err="1" smtClean="0"/>
-              <a:t>블루프린트</a:t>
-            </a:r>
-            <a:endParaRPr lang="ko-KR" altLang="en-US" dirty="0"/>
-          </a:p>
-        </p:txBody>
-      </p:sp>
-      <p:sp>
-        <p:nvSpPr>
-          <p:cNvPr id="30" name="TextBox 29"/>
-          <p:cNvSpPr txBox="1"/>
-          <p:nvPr/>
-        </p:nvSpPr>
-        <p:spPr>
-          <a:xfrm>
-            <a:off x="1617011" y="2372277"/>
-            <a:ext cx="856681" cy="369332"/>
-          </a:xfrm>
-          <a:prstGeom prst="rect">
-            <a:avLst/>
-          </a:prstGeom>
-          <a:noFill/>
-        </p:spPr>
-        <p:txBody>
-          <a:bodyPr wrap="square" rtlCol="0">
-            <a:spAutoFit/>
-          </a:bodyPr>
-          <a:lstStyle/>
-          <a:p>
-            <a:r>
-              <a:rPr lang="ko-KR" altLang="en-US" smtClean="0"/>
-              <a:t>게임</a:t>
-            </a:r>
-            <a:endParaRPr lang="ko-KR" altLang="en-US" dirty="0"/>
-          </a:p>
-        </p:txBody>
-      </p:sp>
-      <p:sp>
-        <p:nvSpPr>
-          <p:cNvPr id="31" name="TextBox 30"/>
-          <p:cNvSpPr txBox="1"/>
-          <p:nvPr/>
-        </p:nvSpPr>
-        <p:spPr>
-          <a:xfrm>
-            <a:off x="4107220" y="2372277"/>
-            <a:ext cx="669216" cy="369332"/>
-          </a:xfrm>
-          <a:prstGeom prst="rect">
-            <a:avLst/>
-          </a:prstGeom>
-          <a:noFill/>
-        </p:spPr>
-        <p:txBody>
-          <a:bodyPr wrap="square" rtlCol="0">
-            <a:spAutoFit/>
-          </a:bodyPr>
-          <a:lstStyle/>
-          <a:p>
-            <a:r>
-              <a:rPr lang="ko-KR" altLang="en-US" dirty="0" smtClean="0"/>
-              <a:t>계층</a:t>
-            </a:r>
-            <a:endParaRPr lang="ko-KR" altLang="en-US" dirty="0"/>
-          </a:p>
-        </p:txBody>
-      </p:sp>
-      <p:sp>
-        <p:nvSpPr>
-          <p:cNvPr id="32" name="TextBox 31"/>
-          <p:cNvSpPr txBox="1"/>
-          <p:nvPr/>
-        </p:nvSpPr>
-        <p:spPr>
-          <a:xfrm>
-            <a:off x="5285998" y="2450599"/>
-            <a:ext cx="5833836" cy="1200329"/>
-          </a:xfrm>
-          <a:prstGeom prst="rect">
-            <a:avLst/>
-          </a:prstGeom>
-          <a:noFill/>
-        </p:spPr>
-        <p:txBody>
-          <a:bodyPr wrap="square" rtlCol="0">
-            <a:spAutoFit/>
-          </a:bodyPr>
-          <a:lstStyle/>
-          <a:p>
-            <a:r>
-              <a:rPr lang="ko-KR" altLang="en-US" dirty="0" smtClean="0"/>
-              <a:t>이미지 오브젝트를 배치하고</a:t>
-            </a:r>
-            <a:endParaRPr lang="en-US" altLang="ko-KR" dirty="0" smtClean="0"/>
-          </a:p>
-          <a:p>
-            <a:r>
-              <a:rPr lang="ko-KR" altLang="en-US" dirty="0" smtClean="0"/>
-              <a:t>블루프린트의 시퀀스를 이용한 </a:t>
-            </a:r>
-            <a:r>
-              <a:rPr lang="ko-KR" altLang="en-US" dirty="0" err="1" smtClean="0"/>
-              <a:t>트랜스폼</a:t>
-            </a:r>
-            <a:r>
-              <a:rPr lang="ko-KR" altLang="en-US" dirty="0" smtClean="0"/>
-              <a:t> 애니메이션</a:t>
-            </a:r>
-            <a:endParaRPr lang="en-US" altLang="ko-KR" dirty="0" smtClean="0"/>
-          </a:p>
-          <a:p>
-            <a:endParaRPr lang="en-US" altLang="ko-KR" dirty="0" smtClean="0"/>
-          </a:p>
-          <a:p>
-            <a:r>
-              <a:rPr lang="en-US" altLang="ko-KR" dirty="0" smtClean="0"/>
-              <a:t>Json </a:t>
-            </a:r>
-            <a:r>
-              <a:rPr lang="ko-KR" altLang="en-US" dirty="0" err="1" smtClean="0"/>
-              <a:t>으로</a:t>
-            </a:r>
-            <a:r>
-              <a:rPr lang="ko-KR" altLang="en-US" dirty="0" smtClean="0"/>
-              <a:t> 저장</a:t>
-            </a:r>
-            <a:r>
-              <a:rPr lang="en-US" altLang="ko-KR" dirty="0" smtClean="0"/>
-              <a:t>, </a:t>
-            </a:r>
-            <a:r>
-              <a:rPr lang="ko-KR" altLang="en-US" dirty="0" smtClean="0"/>
-              <a:t>불러오기 까지 테스트 완료</a:t>
-            </a:r>
-            <a:endParaRPr lang="en-US" altLang="ko-KR" dirty="0" smtClean="0"/>
-          </a:p>
-        </p:txBody>
-      </p:sp>
-      <p:sp>
-        <p:nvSpPr>
-          <p:cNvPr id="33" name="직사각형 32"/>
-          <p:cNvSpPr/>
-          <p:nvPr/>
-        </p:nvSpPr>
-        <p:spPr>
-          <a:xfrm>
-            <a:off x="5285998" y="4283038"/>
-            <a:ext cx="6096000" cy="1923604"/>
+            <a:off x="1051143" y="4513951"/>
+            <a:ext cx="3087256" cy="1810933"/>
           </a:xfrm>
           <a:prstGeom prst="rect">
             <a:avLst/>
           </a:prstGeom>
         </p:spPr>
-        <p:txBody>
-          <a:bodyPr>
-            <a:spAutoFit/>
-          </a:bodyPr>
-          <a:lstStyle/>
-          <a:p>
-            <a:r>
-              <a:rPr lang="ko-KR" altLang="en-US" sz="2000" b="1" dirty="0" err="1"/>
-              <a:t>블루프린트</a:t>
-            </a:r>
-            <a:r>
-              <a:rPr lang="ko-KR" altLang="en-US" sz="2000" b="1" dirty="0"/>
-              <a:t> </a:t>
-            </a:r>
-            <a:r>
-              <a:rPr lang="en-US" altLang="ko-KR" sz="2000" b="1" dirty="0"/>
-              <a:t>(</a:t>
-            </a:r>
-            <a:r>
-              <a:rPr lang="ko-KR" altLang="en-US" sz="2000" b="1" dirty="0" err="1"/>
-              <a:t>언리얼</a:t>
-            </a:r>
-            <a:r>
-              <a:rPr lang="ko-KR" altLang="en-US" sz="2000" b="1" dirty="0"/>
-              <a:t> 엔진 </a:t>
-            </a:r>
-            <a:r>
-              <a:rPr lang="en-US" altLang="ko-KR" sz="2000" b="1" dirty="0"/>
-              <a:t>4 </a:t>
-            </a:r>
-            <a:r>
-              <a:rPr lang="ko-KR" altLang="en-US" sz="2000" b="1" dirty="0"/>
-              <a:t>에서 착안</a:t>
-            </a:r>
-            <a:r>
-              <a:rPr lang="en-US" altLang="ko-KR" sz="2000" b="1" dirty="0" smtClean="0"/>
-              <a:t>)</a:t>
-            </a:r>
-            <a:endParaRPr lang="en-US" altLang="ko-KR" sz="2000" b="1" dirty="0"/>
-          </a:p>
-          <a:p>
-            <a:pPr>
-              <a:lnSpc>
-                <a:spcPct val="150000"/>
-              </a:lnSpc>
-            </a:pPr>
-            <a:r>
-              <a:rPr lang="ko-KR" altLang="en-US" dirty="0"/>
-              <a:t>유형에 따라 실행 내용을 다르게 하고</a:t>
-            </a:r>
-            <a:endParaRPr lang="en-US" altLang="ko-KR" dirty="0"/>
-          </a:p>
-          <a:p>
-            <a:r>
-              <a:rPr lang="ko-KR" altLang="en-US" dirty="0"/>
-              <a:t>그 실행에 필요한 데이터를 연결하여 적용하는 </a:t>
-            </a:r>
-            <a:r>
-              <a:rPr lang="ko-KR" altLang="en-US" dirty="0" smtClean="0"/>
-              <a:t>시스템</a:t>
-            </a:r>
-            <a:endParaRPr lang="en-US" altLang="ko-KR" dirty="0" smtClean="0"/>
-          </a:p>
-          <a:p>
-            <a:endParaRPr lang="en-US" altLang="ko-KR" dirty="0"/>
-          </a:p>
-          <a:p>
-            <a:r>
-              <a:rPr lang="ko-KR" altLang="en-US" dirty="0" smtClean="0"/>
-              <a:t>노드 데이터는 </a:t>
-            </a:r>
-            <a:r>
-              <a:rPr lang="en-US" altLang="ko-KR" dirty="0" smtClean="0"/>
-              <a:t>STL vector </a:t>
-            </a:r>
-            <a:r>
-              <a:rPr lang="ko-KR" altLang="en-US" dirty="0" smtClean="0"/>
-              <a:t>에 담아두고</a:t>
-            </a:r>
-            <a:endParaRPr lang="en-US" altLang="ko-KR" dirty="0" smtClean="0"/>
-          </a:p>
-          <a:p>
-            <a:r>
-              <a:rPr lang="ko-KR" altLang="en-US" dirty="0" smtClean="0"/>
-              <a:t>실행 노드는 더블 </a:t>
-            </a:r>
-            <a:r>
-              <a:rPr lang="ko-KR" altLang="en-US" dirty="0" err="1" smtClean="0"/>
-              <a:t>링크드</a:t>
-            </a:r>
-            <a:r>
-              <a:rPr lang="ko-KR" altLang="en-US" dirty="0" smtClean="0"/>
-              <a:t> 리스트로 연결</a:t>
-            </a:r>
-            <a:endParaRPr lang="ko-KR" altLang="en-US" dirty="0"/>
-          </a:p>
-        </p:txBody>
-      </p:sp>
+      </p:pic>
     </p:spTree>
     <p:extLst>
       <p:ext uri="{BB962C8B-B14F-4D97-AF65-F5344CB8AC3E}">
@@ -7146,8 +7128,20 @@
           <a:lstStyle/>
           <a:p>
             <a:r>
+              <a:rPr lang="ko-KR" altLang="en-US" dirty="0" smtClean="0"/>
+              <a:t>툴</a:t>
+            </a:r>
+            <a:r>
               <a:rPr lang="en-US" altLang="ko-KR" dirty="0" smtClean="0"/>
-              <a:t>WPF - Element</a:t>
+              <a:t> </a:t>
+            </a:r>
+            <a:r>
+              <a:rPr lang="en-US" altLang="ko-KR" dirty="0" smtClean="0"/>
+              <a:t>- </a:t>
+            </a:r>
+            <a:r>
+              <a:rPr lang="en-US" altLang="ko-KR" dirty="0" smtClean="0"/>
+              <a:t>Element</a:t>
             </a:r>
             <a:endParaRPr lang="ko-KR" altLang="en-US" dirty="0"/>
           </a:p>
@@ -7162,7 +7156,7 @@
         <p:spPr>
           <a:xfrm>
             <a:off x="5285998" y="2450599"/>
-            <a:ext cx="5833836" cy="369332"/>
+            <a:ext cx="6382126" cy="646331"/>
           </a:xfrm>
           <a:prstGeom prst="rect">
             <a:avLst/>
@@ -7215,6 +7209,32 @@
               <a:rPr lang="en-US" altLang="ko-KR" dirty="0" smtClean="0"/>
               <a:t>.</a:t>
             </a:r>
+          </a:p>
+          <a:p>
+            <a:r>
+              <a:rPr lang="ko-KR" altLang="en-US" dirty="0" smtClean="0"/>
+              <a:t>이 데이터를 </a:t>
+            </a:r>
+            <a:r>
+              <a:rPr lang="ko-KR" altLang="en-US" dirty="0" smtClean="0"/>
+              <a:t>블루프린트를 입혀 다시 가공해 </a:t>
+            </a:r>
+            <a:r>
+              <a:rPr lang="en-US" altLang="ko-KR" dirty="0" smtClean="0"/>
+              <a:t>Object </a:t>
+            </a:r>
+            <a:r>
+              <a:rPr lang="ko-KR" altLang="en-US" dirty="0" err="1" smtClean="0"/>
+              <a:t>를</a:t>
+            </a:r>
+            <a:r>
+              <a:rPr lang="ko-KR" altLang="en-US" dirty="0" smtClean="0"/>
+              <a:t> 만든다</a:t>
+            </a:r>
+            <a:r>
+              <a:rPr lang="en-US" altLang="ko-KR" dirty="0" smtClean="0"/>
+              <a:t>.</a:t>
+            </a:r>
             <a:endParaRPr lang="en-US" altLang="ko-KR" dirty="0" smtClean="0"/>
           </a:p>
         </p:txBody>
@@ -7227,7 +7247,7 @@
         </p:nvSpPr>
         <p:spPr>
           <a:xfrm>
-            <a:off x="5285997" y="3160365"/>
+            <a:off x="5285997" y="3436590"/>
             <a:ext cx="6382127" cy="954107"/>
           </a:xfrm>
           <a:prstGeom prst="rect">
@@ -7269,11 +7289,7 @@
             </a:r>
             <a:r>
               <a:rPr lang="ko-KR" altLang="en-US" dirty="0" smtClean="0"/>
-              <a:t>부분으로 나누어 </a:t>
-            </a:r>
-            <a:r>
-              <a:rPr lang="ko-KR" altLang="en-US" dirty="0" smtClean="0"/>
-              <a:t>기존의 이미지를 재활용하여 다양한 형태를 구현할 수 있는 구조이다</a:t>
+              <a:t>부분으로 나누어 기존의 이미지를 재활용하여 다양한 형태를 구현할 수 있는 구조이다</a:t>
             </a:r>
             <a:r>
               <a:rPr lang="en-US" altLang="ko-KR" dirty="0" smtClean="0"/>
@@ -7283,9 +7299,69 @@
           </a:p>
         </p:txBody>
       </p:sp>
+      <p:sp>
+        <p:nvSpPr>
+          <p:cNvPr id="22" name="직사각형 21"/>
+          <p:cNvSpPr/>
+          <p:nvPr/>
+        </p:nvSpPr>
+        <p:spPr>
+          <a:xfrm>
+            <a:off x="5285997" y="4543773"/>
+            <a:ext cx="6382127" cy="954107"/>
+          </a:xfrm>
+          <a:prstGeom prst="rect">
+            <a:avLst/>
+          </a:prstGeom>
+        </p:spPr>
+        <p:txBody>
+          <a:bodyPr wrap="square">
+            <a:spAutoFit/>
+          </a:bodyPr>
+          <a:lstStyle/>
+          <a:p>
+            <a:r>
+              <a:rPr lang="ko-KR" altLang="en-US" sz="2000" b="1" dirty="0" smtClean="0"/>
+              <a:t>상태</a:t>
+            </a:r>
+            <a:endParaRPr lang="en-US" altLang="ko-KR" sz="2000" b="1" dirty="0" smtClean="0"/>
+          </a:p>
+          <a:p>
+            <a:r>
+              <a:rPr lang="ko-KR" altLang="en-US" dirty="0" smtClean="0"/>
+              <a:t>같은 </a:t>
+            </a:r>
+            <a:r>
+              <a:rPr lang="ko-KR" altLang="en-US" dirty="0" err="1" smtClean="0"/>
+              <a:t>이름이여도</a:t>
+            </a:r>
+            <a:r>
+              <a:rPr lang="ko-KR" altLang="en-US" dirty="0" smtClean="0"/>
+              <a:t> 형태가 </a:t>
+            </a:r>
+            <a:r>
+              <a:rPr lang="ko-KR" altLang="en-US" dirty="0" err="1" smtClean="0"/>
+              <a:t>다를걸</a:t>
+            </a:r>
+            <a:r>
+              <a:rPr lang="ko-KR" altLang="en-US" dirty="0" smtClean="0"/>
+              <a:t> 고려해 </a:t>
+            </a:r>
+            <a:r>
+              <a:rPr lang="ko-KR" altLang="en-US" dirty="0" err="1" smtClean="0"/>
+              <a:t>상태값에</a:t>
+            </a:r>
+            <a:r>
+              <a:rPr lang="ko-KR" altLang="en-US" dirty="0" smtClean="0"/>
+              <a:t> 따른 이미지를 변경할 수 있도록 설계</a:t>
+            </a:r>
+            <a:endParaRPr lang="ko-KR" altLang="en-US" dirty="0"/>
+          </a:p>
+        </p:txBody>
+      </p:sp>
       <p:pic>
         <p:nvPicPr>
-          <p:cNvPr id="4" name="그림 3"/>
+          <p:cNvPr id="3" name="그림 2"/>
           <p:cNvPicPr>
             <a:picLocks noChangeAspect="1"/>
           </p:cNvPicPr>
@@ -7299,7 +7375,7 @@
         </p:blipFill>
         <p:spPr>
           <a:xfrm>
-            <a:off x="312081" y="2543175"/>
+            <a:off x="340656" y="2563027"/>
             <a:ext cx="4674845" cy="3926605"/>
           </a:xfrm>
           <a:prstGeom prst="rect">
@@ -7307,66 +7383,6 @@
           </a:prstGeom>
         </p:spPr>
       </p:pic>
-      <p:sp>
-        <p:nvSpPr>
-          <p:cNvPr id="22" name="직사각형 21"/>
-          <p:cNvSpPr/>
-          <p:nvPr/>
-        </p:nvSpPr>
-        <p:spPr>
-          <a:xfrm>
-            <a:off x="5285997" y="4267548"/>
-            <a:ext cx="6382127" cy="954107"/>
-          </a:xfrm>
-          <a:prstGeom prst="rect">
-            <a:avLst/>
-          </a:prstGeom>
-        </p:spPr>
-        <p:txBody>
-          <a:bodyPr wrap="square">
-            <a:spAutoFit/>
-          </a:bodyPr>
-          <a:lstStyle/>
-          <a:p>
-            <a:r>
-              <a:rPr lang="ko-KR" altLang="en-US" sz="2000" b="1" dirty="0" smtClean="0"/>
-              <a:t>상태</a:t>
-            </a:r>
-            <a:endParaRPr lang="en-US" altLang="ko-KR" sz="2000" b="1" dirty="0" smtClean="0"/>
-          </a:p>
-          <a:p>
-            <a:r>
-              <a:rPr lang="ko-KR" altLang="en-US" dirty="0" smtClean="0"/>
-              <a:t>같은 </a:t>
-            </a:r>
-            <a:r>
-              <a:rPr lang="ko-KR" altLang="en-US" dirty="0" err="1" smtClean="0"/>
-              <a:t>이름이여도</a:t>
-            </a:r>
-            <a:r>
-              <a:rPr lang="ko-KR" altLang="en-US" dirty="0" smtClean="0"/>
-              <a:t> 형태가 </a:t>
-            </a:r>
-            <a:r>
-              <a:rPr lang="ko-KR" altLang="en-US" dirty="0" err="1" smtClean="0"/>
-              <a:t>다를걸</a:t>
-            </a:r>
-            <a:r>
-              <a:rPr lang="ko-KR" altLang="en-US" dirty="0" smtClean="0"/>
-              <a:t> 고려해 </a:t>
-            </a:r>
-            <a:r>
-              <a:rPr lang="ko-KR" altLang="en-US" dirty="0" err="1" smtClean="0"/>
-              <a:t>상태값에</a:t>
-            </a:r>
-            <a:r>
-              <a:rPr lang="ko-KR" altLang="en-US" dirty="0" smtClean="0"/>
-              <a:t> 따른 이미지를 변경할 수 있도록 설계</a:t>
-            </a:r>
-            <a:endParaRPr lang="ko-KR" altLang="en-US" dirty="0"/>
-          </a:p>
-        </p:txBody>
-      </p:sp>
     </p:spTree>
     <p:extLst>
       <p:ext uri="{BB962C8B-B14F-4D97-AF65-F5344CB8AC3E}">
@@ -7388,6 +7404,206 @@
 </file>
 
 <file path=ppt/slides/slide7.xml><?xml version="1.0" encoding="utf-8"?>
+<p:sld xmlns:a="http://schemas.openxmlformats.org/drawingml/2006/main" xmlns:r="http://schemas.openxmlformats.org/officeDocument/2006/relationships" xmlns:p="http://schemas.openxmlformats.org/presentationml/2006/main">
+  <p:cSld>
+    <p:spTree>
+      <p:nvGrpSpPr>
+        <p:cNvPr id="1" name=""/>
+        <p:cNvGrpSpPr/>
+        <p:nvPr/>
+      </p:nvGrpSpPr>
+      <p:grpSpPr>
+        <a:xfrm>
+          <a:off x="0" y="0"/>
+          <a:ext cx="0" cy="0"/>
+          <a:chOff x="0" y="0"/>
+          <a:chExt cx="0" cy="0"/>
+        </a:xfrm>
+      </p:grpSpPr>
+      <p:sp>
+        <p:nvSpPr>
+          <p:cNvPr id="2" name="제목 1"/>
+          <p:cNvSpPr>
+            <a:spLocks noGrp="1"/>
+          </p:cNvSpPr>
+          <p:nvPr>
+            <p:ph type="title"/>
+          </p:nvPr>
+        </p:nvSpPr>
+        <p:spPr/>
+        <p:txBody>
+          <a:bodyPr/>
+          <a:lstStyle/>
+          <a:p>
+            <a:r>
+              <a:rPr lang="ko-KR" altLang="en-US" dirty="0" smtClean="0"/>
+              <a:t>사용자 지정 </a:t>
+            </a:r>
+            <a:r>
+              <a:rPr lang="en-US" altLang="ko-KR" dirty="0" smtClean="0"/>
+              <a:t>UI </a:t>
+            </a:r>
+            <a:r>
+              <a:rPr lang="ko-KR" altLang="en-US" dirty="0" smtClean="0"/>
+              <a:t>설계</a:t>
+            </a:r>
+            <a:endParaRPr lang="ko-KR" altLang="en-US" dirty="0"/>
+          </a:p>
+        </p:txBody>
+      </p:sp>
+      <p:sp>
+        <p:nvSpPr>
+          <p:cNvPr id="32" name="TextBox 31"/>
+          <p:cNvSpPr txBox="1"/>
+          <p:nvPr/>
+        </p:nvSpPr>
+        <p:spPr>
+          <a:xfrm>
+            <a:off x="5285998" y="2450599"/>
+            <a:ext cx="6096000" cy="677108"/>
+          </a:xfrm>
+          <a:prstGeom prst="rect">
+            <a:avLst/>
+          </a:prstGeom>
+          <a:noFill/>
+        </p:spPr>
+        <p:txBody>
+          <a:bodyPr wrap="square" rtlCol="0">
+            <a:spAutoFit/>
+          </a:bodyPr>
+          <a:lstStyle/>
+          <a:p>
+            <a:r>
+              <a:rPr lang="ko-KR" altLang="en-US" sz="2000" b="1" dirty="0" smtClean="0"/>
+              <a:t>버튼</a:t>
+            </a:r>
+            <a:endParaRPr lang="en-US" altLang="ko-KR" sz="2000" b="1" dirty="0" smtClean="0"/>
+          </a:p>
+          <a:p>
+            <a:r>
+              <a:rPr lang="ko-KR" altLang="en-US" dirty="0" smtClean="0"/>
+              <a:t>씬 전환</a:t>
+            </a:r>
+            <a:r>
+              <a:rPr lang="en-US" altLang="ko-KR" dirty="0" smtClean="0"/>
+              <a:t>, </a:t>
+            </a:r>
+            <a:r>
+              <a:rPr lang="ko-KR" altLang="en-US" dirty="0" smtClean="0"/>
+              <a:t>저장</a:t>
+            </a:r>
+            <a:r>
+              <a:rPr lang="en-US" altLang="ko-KR" dirty="0" smtClean="0"/>
+              <a:t>, </a:t>
+            </a:r>
+            <a:r>
+              <a:rPr lang="ko-KR" altLang="en-US" dirty="0" smtClean="0"/>
+              <a:t>로드 와 같은 기능</a:t>
+            </a:r>
+            <a:r>
+              <a:rPr lang="ko-KR" altLang="en-US" dirty="0" smtClean="0"/>
+              <a:t>을 구현한다</a:t>
+            </a:r>
+            <a:r>
+              <a:rPr lang="en-US" altLang="ko-KR" dirty="0" smtClean="0"/>
+              <a:t>.</a:t>
+            </a:r>
+            <a:endParaRPr lang="en-US" altLang="ko-KR" dirty="0" smtClean="0"/>
+          </a:p>
+        </p:txBody>
+      </p:sp>
+      <p:sp>
+        <p:nvSpPr>
+          <p:cNvPr id="4" name="직사각형 3"/>
+          <p:cNvSpPr/>
+          <p:nvPr/>
+        </p:nvSpPr>
+        <p:spPr>
+          <a:xfrm>
+            <a:off x="5285998" y="3376196"/>
+            <a:ext cx="6096000" cy="954107"/>
+          </a:xfrm>
+          <a:prstGeom prst="rect">
+            <a:avLst/>
+          </a:prstGeom>
+        </p:spPr>
+        <p:txBody>
+          <a:bodyPr>
+            <a:spAutoFit/>
+          </a:bodyPr>
+          <a:lstStyle/>
+          <a:p>
+            <a:r>
+              <a:rPr lang="ko-KR" altLang="en-US" sz="2000" b="1" dirty="0" err="1"/>
+              <a:t>예약기능</a:t>
+            </a:r>
+            <a:endParaRPr lang="en-US" altLang="ko-KR" sz="2000" b="1" dirty="0"/>
+          </a:p>
+          <a:p>
+            <a:r>
+              <a:rPr lang="ko-KR" altLang="en-US" dirty="0" err="1"/>
+              <a:t>대화창</a:t>
+            </a:r>
+            <a:r>
+              <a:rPr lang="en-US" altLang="ko-KR" dirty="0"/>
+              <a:t>, </a:t>
+            </a:r>
+            <a:r>
+              <a:rPr lang="ko-KR" altLang="en-US" dirty="0"/>
+              <a:t>이름</a:t>
+            </a:r>
+            <a:r>
+              <a:rPr lang="en-US" altLang="ko-KR" dirty="0"/>
+              <a:t>, </a:t>
+            </a:r>
+            <a:r>
+              <a:rPr lang="ko-KR" altLang="en-US" dirty="0"/>
+              <a:t>배경 </a:t>
+            </a:r>
+            <a:r>
+              <a:rPr lang="ko-KR" altLang="en-US" dirty="0" smtClean="0"/>
+              <a:t>등 대화문에 의해 처리될 창을</a:t>
+            </a:r>
+            <a:endParaRPr lang="en-US" altLang="ko-KR" dirty="0" smtClean="0"/>
+          </a:p>
+          <a:p>
+            <a:r>
+              <a:rPr lang="ko-KR" altLang="en-US" dirty="0" smtClean="0"/>
+              <a:t>배치한다</a:t>
+            </a:r>
+            <a:r>
+              <a:rPr lang="en-US" altLang="ko-KR" dirty="0" smtClean="0"/>
+              <a:t>.</a:t>
+            </a:r>
+            <a:r>
+              <a:rPr lang="ko-KR" altLang="en-US" dirty="0" smtClean="0"/>
+              <a:t>  </a:t>
+            </a:r>
+            <a:endParaRPr lang="en-US" altLang="ko-KR" dirty="0"/>
+          </a:p>
+        </p:txBody>
+      </p:sp>
+    </p:spTree>
+    <p:extLst>
+      <p:ext uri="{BB962C8B-B14F-4D97-AF65-F5344CB8AC3E}">
+        <p14:creationId xmlns:p14="http://schemas.microsoft.com/office/powerpoint/2010/main" val="2427597929"/>
+      </p:ext>
+    </p:extLst>
+  </p:cSld>
+  <p:clrMapOvr>
+    <a:masterClrMapping/>
+  </p:clrMapOvr>
+  <p:timing>
+    <p:tnLst>
+      <p:par>
+        <p:cTn id="1" dur="indefinite" restart="never" nodeType="tmRoot"/>
+      </p:par>
+    </p:tnLst>
+  </p:timing>
+</p:sld>
+</file>
+
+<file path=ppt/slides/slide8.xml><?xml version="1.0" encoding="utf-8"?>
 <p:sld xmlns:a="http://schemas.openxmlformats.org/drawingml/2006/main" xmlns:r="http://schemas.openxmlformats.org/officeDocument/2006/relationships" xmlns:p="http://schemas.openxmlformats.org/presentationml/2006/main">
   <p:cSld>
     <p:spTree>

</xml_diff>